<commit_message>
Add transparency to 2D images
</commit_message>
<xml_diff>
--- a/AAFlashCards.pptx
+++ b/AAFlashCards.pptx
@@ -123,6 +123,11 @@
       </a:defRPr>
     </a:lvl9pPr>
   </p:defaultTextStyle>
+  <p:extLst>
+    <p:ext uri="{EFAFB233-063F-42B5-8137-9DF3F51BA10A}">
+      <p15:sldGuideLst xmlns:p15="http://schemas.microsoft.com/office/powerpoint/2012/main"/>
+    </p:ext>
+  </p:extLst>
 </p:presentation>
 </file>
 
@@ -257,7 +262,7 @@
           <a:p>
             <a:fld id="{3051642B-6A04-0D49-98A7-E756BFF6D6B2}" type="datetimeFigureOut">
               <a:rPr lang="en-US" smtClean="0"/>
-              <a:t>12/1/21</a:t>
+              <a:t>12/3/21</a:t>
             </a:fld>
             <a:endParaRPr lang="en-US"/>
           </a:p>
@@ -427,7 +432,7 @@
           <a:p>
             <a:fld id="{3051642B-6A04-0D49-98A7-E756BFF6D6B2}" type="datetimeFigureOut">
               <a:rPr lang="en-US" smtClean="0"/>
-              <a:t>12/1/21</a:t>
+              <a:t>12/3/21</a:t>
             </a:fld>
             <a:endParaRPr lang="en-US"/>
           </a:p>
@@ -607,7 +612,7 @@
           <a:p>
             <a:fld id="{3051642B-6A04-0D49-98A7-E756BFF6D6B2}" type="datetimeFigureOut">
               <a:rPr lang="en-US" smtClean="0"/>
-              <a:t>12/1/21</a:t>
+              <a:t>12/3/21</a:t>
             </a:fld>
             <a:endParaRPr lang="en-US"/>
           </a:p>
@@ -777,7 +782,7 @@
           <a:p>
             <a:fld id="{3051642B-6A04-0D49-98A7-E756BFF6D6B2}" type="datetimeFigureOut">
               <a:rPr lang="en-US" smtClean="0"/>
-              <a:t>12/1/21</a:t>
+              <a:t>12/3/21</a:t>
             </a:fld>
             <a:endParaRPr lang="en-US"/>
           </a:p>
@@ -1021,7 +1026,7 @@
           <a:p>
             <a:fld id="{3051642B-6A04-0D49-98A7-E756BFF6D6B2}" type="datetimeFigureOut">
               <a:rPr lang="en-US" smtClean="0"/>
-              <a:t>12/1/21</a:t>
+              <a:t>12/3/21</a:t>
             </a:fld>
             <a:endParaRPr lang="en-US"/>
           </a:p>
@@ -1253,7 +1258,7 @@
           <a:p>
             <a:fld id="{3051642B-6A04-0D49-98A7-E756BFF6D6B2}" type="datetimeFigureOut">
               <a:rPr lang="en-US" smtClean="0"/>
-              <a:t>12/1/21</a:t>
+              <a:t>12/3/21</a:t>
             </a:fld>
             <a:endParaRPr lang="en-US"/>
           </a:p>
@@ -1620,7 +1625,7 @@
           <a:p>
             <a:fld id="{3051642B-6A04-0D49-98A7-E756BFF6D6B2}" type="datetimeFigureOut">
               <a:rPr lang="en-US" smtClean="0"/>
-              <a:t>12/1/21</a:t>
+              <a:t>12/3/21</a:t>
             </a:fld>
             <a:endParaRPr lang="en-US"/>
           </a:p>
@@ -1738,7 +1743,7 @@
           <a:p>
             <a:fld id="{3051642B-6A04-0D49-98A7-E756BFF6D6B2}" type="datetimeFigureOut">
               <a:rPr lang="en-US" smtClean="0"/>
-              <a:t>12/1/21</a:t>
+              <a:t>12/3/21</a:t>
             </a:fld>
             <a:endParaRPr lang="en-US"/>
           </a:p>
@@ -1833,7 +1838,7 @@
           <a:p>
             <a:fld id="{3051642B-6A04-0D49-98A7-E756BFF6D6B2}" type="datetimeFigureOut">
               <a:rPr lang="en-US" smtClean="0"/>
-              <a:t>12/1/21</a:t>
+              <a:t>12/3/21</a:t>
             </a:fld>
             <a:endParaRPr lang="en-US"/>
           </a:p>
@@ -2110,7 +2115,7 @@
           <a:p>
             <a:fld id="{3051642B-6A04-0D49-98A7-E756BFF6D6B2}" type="datetimeFigureOut">
               <a:rPr lang="en-US" smtClean="0"/>
-              <a:t>12/1/21</a:t>
+              <a:t>12/3/21</a:t>
             </a:fld>
             <a:endParaRPr lang="en-US"/>
           </a:p>
@@ -2367,7 +2372,7 @@
           <a:p>
             <a:fld id="{3051642B-6A04-0D49-98A7-E756BFF6D6B2}" type="datetimeFigureOut">
               <a:rPr lang="en-US" smtClean="0"/>
-              <a:t>12/1/21</a:t>
+              <a:t>12/3/21</a:t>
             </a:fld>
             <a:endParaRPr lang="en-US"/>
           </a:p>
@@ -2580,7 +2585,7 @@
           <a:p>
             <a:fld id="{3051642B-6A04-0D49-98A7-E756BFF6D6B2}" type="datetimeFigureOut">
               <a:rPr lang="en-US" smtClean="0"/>
-              <a:t>12/1/21</a:t>
+              <a:t>12/3/21</a:t>
             </a:fld>
             <a:endParaRPr lang="en-US"/>
           </a:p>
@@ -3000,7 +3005,20 @@
           <p:nvPr/>
         </p:nvPicPr>
         <p:blipFill>
-          <a:blip r:embed="rId2"/>
+          <a:blip r:embed="rId2">
+            <a:clrChange>
+              <a:clrFrom>
+                <a:srgbClr val="000000">
+                  <a:alpha val="0"/>
+                </a:srgbClr>
+              </a:clrFrom>
+              <a:clrTo>
+                <a:srgbClr val="000000">
+                  <a:alpha val="0"/>
+                </a:srgbClr>
+              </a:clrTo>
+            </a:clrChange>
+          </a:blip>
           <a:stretch>
             <a:fillRect/>
           </a:stretch>
@@ -3060,7 +3078,20 @@
           <p:nvPr/>
         </p:nvPicPr>
         <p:blipFill>
-          <a:blip r:embed="rId2"/>
+          <a:blip r:embed="rId2">
+            <a:clrChange>
+              <a:clrFrom>
+                <a:srgbClr val="000000">
+                  <a:alpha val="0"/>
+                </a:srgbClr>
+              </a:clrFrom>
+              <a:clrTo>
+                <a:srgbClr val="000000">
+                  <a:alpha val="0"/>
+                </a:srgbClr>
+              </a:clrTo>
+            </a:clrChange>
+          </a:blip>
           <a:stretch>
             <a:fillRect/>
           </a:stretch>
@@ -3120,7 +3151,20 @@
           <p:nvPr/>
         </p:nvPicPr>
         <p:blipFill>
-          <a:blip r:embed="rId2"/>
+          <a:blip r:embed="rId2">
+            <a:clrChange>
+              <a:clrFrom>
+                <a:srgbClr val="000000">
+                  <a:alpha val="0"/>
+                </a:srgbClr>
+              </a:clrFrom>
+              <a:clrTo>
+                <a:srgbClr val="000000">
+                  <a:alpha val="0"/>
+                </a:srgbClr>
+              </a:clrTo>
+            </a:clrChange>
+          </a:blip>
           <a:stretch>
             <a:fillRect/>
           </a:stretch>
@@ -3232,7 +3276,20 @@
           <p:nvPr/>
         </p:nvPicPr>
         <p:blipFill>
-          <a:blip r:embed="rId2"/>
+          <a:blip r:embed="rId2">
+            <a:clrChange>
+              <a:clrFrom>
+                <a:srgbClr val="000000">
+                  <a:alpha val="0"/>
+                </a:srgbClr>
+              </a:clrFrom>
+              <a:clrTo>
+                <a:srgbClr val="000000">
+                  <a:alpha val="0"/>
+                </a:srgbClr>
+              </a:clrTo>
+            </a:clrChange>
+          </a:blip>
           <a:stretch>
             <a:fillRect/>
           </a:stretch>
@@ -3344,7 +3401,20 @@
           <p:nvPr/>
         </p:nvPicPr>
         <p:blipFill>
-          <a:blip r:embed="rId2"/>
+          <a:blip r:embed="rId2">
+            <a:clrChange>
+              <a:clrFrom>
+                <a:srgbClr val="000000">
+                  <a:alpha val="0"/>
+                </a:srgbClr>
+              </a:clrFrom>
+              <a:clrTo>
+                <a:srgbClr val="000000">
+                  <a:alpha val="0"/>
+                </a:srgbClr>
+              </a:clrTo>
+            </a:clrChange>
+          </a:blip>
           <a:stretch>
             <a:fillRect/>
           </a:stretch>
@@ -3404,7 +3474,20 @@
           <p:nvPr/>
         </p:nvPicPr>
         <p:blipFill>
-          <a:blip r:embed="rId2"/>
+          <a:blip r:embed="rId2">
+            <a:clrChange>
+              <a:clrFrom>
+                <a:srgbClr val="000000">
+                  <a:alpha val="0"/>
+                </a:srgbClr>
+              </a:clrFrom>
+              <a:clrTo>
+                <a:srgbClr val="000000">
+                  <a:alpha val="0"/>
+                </a:srgbClr>
+              </a:clrTo>
+            </a:clrChange>
+          </a:blip>
           <a:stretch>
             <a:fillRect/>
           </a:stretch>
@@ -3464,7 +3547,20 @@
           <p:nvPr/>
         </p:nvPicPr>
         <p:blipFill>
-          <a:blip r:embed="rId2"/>
+          <a:blip r:embed="rId2">
+            <a:clrChange>
+              <a:clrFrom>
+                <a:srgbClr val="000000">
+                  <a:alpha val="0"/>
+                </a:srgbClr>
+              </a:clrFrom>
+              <a:clrTo>
+                <a:srgbClr val="000000">
+                  <a:alpha val="0"/>
+                </a:srgbClr>
+              </a:clrTo>
+            </a:clrChange>
+          </a:blip>
           <a:stretch>
             <a:fillRect/>
           </a:stretch>
@@ -3576,7 +3672,20 @@
           <p:nvPr/>
         </p:nvPicPr>
         <p:blipFill>
-          <a:blip r:embed="rId2"/>
+          <a:blip r:embed="rId2">
+            <a:clrChange>
+              <a:clrFrom>
+                <a:srgbClr val="000000">
+                  <a:alpha val="0"/>
+                </a:srgbClr>
+              </a:clrFrom>
+              <a:clrTo>
+                <a:srgbClr val="000000">
+                  <a:alpha val="0"/>
+                </a:srgbClr>
+              </a:clrTo>
+            </a:clrChange>
+          </a:blip>
           <a:stretch>
             <a:fillRect/>
           </a:stretch>
@@ -3636,7 +3745,20 @@
           <p:nvPr/>
         </p:nvPicPr>
         <p:blipFill>
-          <a:blip r:embed="rId2"/>
+          <a:blip r:embed="rId2">
+            <a:clrChange>
+              <a:clrFrom>
+                <a:srgbClr val="000000">
+                  <a:alpha val="0"/>
+                </a:srgbClr>
+              </a:clrFrom>
+              <a:clrTo>
+                <a:srgbClr val="000000">
+                  <a:alpha val="0"/>
+                </a:srgbClr>
+              </a:clrTo>
+            </a:clrChange>
+          </a:blip>
           <a:stretch>
             <a:fillRect/>
           </a:stretch>
@@ -3696,7 +3818,20 @@
           <p:nvPr/>
         </p:nvPicPr>
         <p:blipFill>
-          <a:blip r:embed="rId2"/>
+          <a:blip r:embed="rId2">
+            <a:clrChange>
+              <a:clrFrom>
+                <a:srgbClr val="000000">
+                  <a:alpha val="0"/>
+                </a:srgbClr>
+              </a:clrFrom>
+              <a:clrTo>
+                <a:srgbClr val="000000">
+                  <a:alpha val="0"/>
+                </a:srgbClr>
+              </a:clrTo>
+            </a:clrChange>
+          </a:blip>
           <a:stretch>
             <a:fillRect/>
           </a:stretch>
@@ -3860,7 +3995,20 @@
           <p:nvPr/>
         </p:nvPicPr>
         <p:blipFill>
-          <a:blip r:embed="rId2"/>
+          <a:blip r:embed="rId2">
+            <a:clrChange>
+              <a:clrFrom>
+                <a:srgbClr val="000000">
+                  <a:alpha val="0"/>
+                </a:srgbClr>
+              </a:clrFrom>
+              <a:clrTo>
+                <a:srgbClr val="000000">
+                  <a:alpha val="0"/>
+                </a:srgbClr>
+              </a:clrTo>
+            </a:clrChange>
+          </a:blip>
           <a:stretch>
             <a:fillRect/>
           </a:stretch>
@@ -4053,7 +4201,20 @@
           <p:nvPr/>
         </p:nvPicPr>
         <p:blipFill>
-          <a:blip r:embed="rId2"/>
+          <a:blip r:embed="rId2">
+            <a:clrChange>
+              <a:clrFrom>
+                <a:srgbClr val="000000">
+                  <a:alpha val="0"/>
+                </a:srgbClr>
+              </a:clrFrom>
+              <a:clrTo>
+                <a:srgbClr val="000000">
+                  <a:alpha val="0"/>
+                </a:srgbClr>
+              </a:clrTo>
+            </a:clrChange>
+          </a:blip>
           <a:stretch>
             <a:fillRect/>
           </a:stretch>
@@ -4113,7 +4274,20 @@
           <p:nvPr/>
         </p:nvPicPr>
         <p:blipFill>
-          <a:blip r:embed="rId2"/>
+          <a:blip r:embed="rId2">
+            <a:clrChange>
+              <a:clrFrom>
+                <a:srgbClr val="000000">
+                  <a:alpha val="0"/>
+                </a:srgbClr>
+              </a:clrFrom>
+              <a:clrTo>
+                <a:srgbClr val="000000">
+                  <a:alpha val="0"/>
+                </a:srgbClr>
+              </a:clrTo>
+            </a:clrChange>
+          </a:blip>
           <a:stretch>
             <a:fillRect/>
           </a:stretch>
@@ -4277,7 +4451,20 @@
           <p:nvPr/>
         </p:nvPicPr>
         <p:blipFill>
-          <a:blip r:embed="rId2"/>
+          <a:blip r:embed="rId2">
+            <a:clrChange>
+              <a:clrFrom>
+                <a:srgbClr val="000000">
+                  <a:alpha val="0"/>
+                </a:srgbClr>
+              </a:clrFrom>
+              <a:clrTo>
+                <a:srgbClr val="000000">
+                  <a:alpha val="0"/>
+                </a:srgbClr>
+              </a:clrTo>
+            </a:clrChange>
+          </a:blip>
           <a:stretch>
             <a:fillRect/>
           </a:stretch>
@@ -4337,7 +4524,20 @@
           <p:nvPr/>
         </p:nvPicPr>
         <p:blipFill>
-          <a:blip r:embed="rId2"/>
+          <a:blip r:embed="rId2">
+            <a:clrChange>
+              <a:clrFrom>
+                <a:srgbClr val="000000">
+                  <a:alpha val="0"/>
+                </a:srgbClr>
+              </a:clrFrom>
+              <a:clrTo>
+                <a:srgbClr val="000000">
+                  <a:alpha val="0"/>
+                </a:srgbClr>
+              </a:clrTo>
+            </a:clrChange>
+          </a:blip>
           <a:stretch>
             <a:fillRect/>
           </a:stretch>
@@ -4397,7 +4597,20 @@
           <p:nvPr/>
         </p:nvPicPr>
         <p:blipFill>
-          <a:blip r:embed="rId2"/>
+          <a:blip r:embed="rId2">
+            <a:clrChange>
+              <a:clrFrom>
+                <a:srgbClr val="000000">
+                  <a:alpha val="0"/>
+                </a:srgbClr>
+              </a:clrFrom>
+              <a:clrTo>
+                <a:srgbClr val="000000">
+                  <a:alpha val="0"/>
+                </a:srgbClr>
+              </a:clrTo>
+            </a:clrChange>
+          </a:blip>
           <a:stretch>
             <a:fillRect/>
           </a:stretch>
@@ -4457,7 +4670,20 @@
           <p:nvPr/>
         </p:nvPicPr>
         <p:blipFill>
-          <a:blip r:embed="rId2"/>
+          <a:blip r:embed="rId2">
+            <a:clrChange>
+              <a:clrFrom>
+                <a:srgbClr val="000000">
+                  <a:alpha val="0"/>
+                </a:srgbClr>
+              </a:clrFrom>
+              <a:clrTo>
+                <a:srgbClr val="000000">
+                  <a:alpha val="0"/>
+                </a:srgbClr>
+              </a:clrTo>
+            </a:clrChange>
+          </a:blip>
           <a:stretch>
             <a:fillRect/>
           </a:stretch>
@@ -4517,7 +4743,20 @@
           <p:nvPr/>
         </p:nvPicPr>
         <p:blipFill>
-          <a:blip r:embed="rId2"/>
+          <a:blip r:embed="rId2">
+            <a:clrChange>
+              <a:clrFrom>
+                <a:srgbClr val="000000">
+                  <a:alpha val="0"/>
+                </a:srgbClr>
+              </a:clrFrom>
+              <a:clrTo>
+                <a:srgbClr val="000000">
+                  <a:alpha val="0"/>
+                </a:srgbClr>
+              </a:clrTo>
+            </a:clrChange>
+          </a:blip>
           <a:stretch>
             <a:fillRect/>
           </a:stretch>
@@ -4577,7 +4816,20 @@
           <p:nvPr/>
         </p:nvPicPr>
         <p:blipFill>
-          <a:blip r:embed="rId2"/>
+          <a:blip r:embed="rId2">
+            <a:clrChange>
+              <a:clrFrom>
+                <a:srgbClr val="000000">
+                  <a:alpha val="0"/>
+                </a:srgbClr>
+              </a:clrFrom>
+              <a:clrTo>
+                <a:srgbClr val="000000">
+                  <a:alpha val="0"/>
+                </a:srgbClr>
+              </a:clrTo>
+            </a:clrChange>
+          </a:blip>
           <a:stretch>
             <a:fillRect/>
           </a:stretch>
@@ -4689,7 +4941,20 @@
           <p:nvPr/>
         </p:nvPicPr>
         <p:blipFill>
-          <a:blip r:embed="rId2"/>
+          <a:blip r:embed="rId2">
+            <a:clrChange>
+              <a:clrFrom>
+                <a:srgbClr val="000000">
+                  <a:alpha val="0"/>
+                </a:srgbClr>
+              </a:clrFrom>
+              <a:clrTo>
+                <a:srgbClr val="000000">
+                  <a:alpha val="0"/>
+                </a:srgbClr>
+              </a:clrTo>
+            </a:clrChange>
+          </a:blip>
           <a:stretch>
             <a:fillRect/>
           </a:stretch>

</xml_diff>